<commit_message>
Erste Übung: Ausdrücke und Interactive
</commit_message>
<xml_diff>
--- a/FSharp.pptx
+++ b/FSharp.pptx
@@ -13320,13 +13320,18 @@
           <a:p>
             <a:r>
               <a:rPr lang="de-DE" dirty="0"/>
-              <a:t>Alt </a:t>
-            </a:r>
-            <a:r>
-              <a:rPr lang="de-DE"/>
-              <a:t>+ Enter</a:t>
-            </a:r>
-            <a:endParaRPr lang="de-DE" dirty="0"/>
+              <a:t>Alt + Enter</a:t>
+            </a:r>
+          </a:p>
+          <a:p>
+            <a:r>
+              <a:rPr lang="de-DE" dirty="0" err="1"/>
+              <a:t>Reset</a:t>
+            </a:r>
+            <a:r>
+              <a:rPr lang="de-DE" dirty="0"/>
+              <a:t> setzt zurück</a:t>
+            </a:r>
           </a:p>
           <a:p>
             <a:endParaRPr lang="de-DE" dirty="0"/>
@@ -13478,6 +13483,55 @@
                                           <p:spTgt spid="3">
                                             <p:txEl>
                                               <p:pRg st="2" end="2"/>
+                                            </p:txEl>
+                                          </p:spTgt>
+                                        </p:tgtEl>
+                                        <p:attrNameLst>
+                                          <p:attrName>style.visibility</p:attrName>
+                                        </p:attrNameLst>
+                                      </p:cBhvr>
+                                      <p:to>
+                                        <p:strVal val="visible"/>
+                                      </p:to>
+                                    </p:set>
+                                  </p:childTnLst>
+                                </p:cTn>
+                              </p:par>
+                            </p:childTnLst>
+                          </p:cTn>
+                        </p:par>
+                      </p:childTnLst>
+                    </p:cTn>
+                  </p:par>
+                  <p:par>
+                    <p:cTn id="15" fill="hold">
+                      <p:stCondLst>
+                        <p:cond delay="indefinite"/>
+                      </p:stCondLst>
+                      <p:childTnLst>
+                        <p:par>
+                          <p:cTn id="16" fill="hold">
+                            <p:stCondLst>
+                              <p:cond delay="0"/>
+                            </p:stCondLst>
+                            <p:childTnLst>
+                              <p:par>
+                                <p:cTn id="17" presetID="1" presetClass="entr" presetSubtype="0" fill="hold" grpId="0" nodeType="clickEffect">
+                                  <p:stCondLst>
+                                    <p:cond delay="0"/>
+                                  </p:stCondLst>
+                                  <p:childTnLst>
+                                    <p:set>
+                                      <p:cBhvr>
+                                        <p:cTn id="18" dur="1" fill="hold">
+                                          <p:stCondLst>
+                                            <p:cond delay="0"/>
+                                          </p:stCondLst>
+                                        </p:cTn>
+                                        <p:tgtEl>
+                                          <p:spTgt spid="3">
+                                            <p:txEl>
+                                              <p:pRg st="3" end="3"/>
                                             </p:txEl>
                                           </p:spTgt>
                                         </p:tgtEl>

</xml_diff>

<commit_message>
REPL zu erst erklärt.
</commit_message>
<xml_diff>
--- a/FSharp.pptx
+++ b/FSharp.pptx
@@ -31,7 +31,7 @@
     <p:sldId id="300" r:id="rId22"/>
     <p:sldId id="302" r:id="rId23"/>
     <p:sldId id="303" r:id="rId24"/>
-    <p:sldId id="304" r:id="rId25"/>
+    <p:sldId id="311" r:id="rId25"/>
     <p:sldId id="305" r:id="rId26"/>
     <p:sldId id="306" r:id="rId27"/>
     <p:sldId id="309" r:id="rId28"/>
@@ -246,7 +246,7 @@
           <a:p>
             <a:fld id="{8583A242-7230-4070-B2AF-A33EB304C08D}" type="datetimeFigureOut">
               <a:rPr lang="en-US" smtClean="0"/>
-              <a:t>3/10/2017</a:t>
+              <a:t>3/11/2017</a:t>
             </a:fld>
             <a:endParaRPr lang="en-US"/>
           </a:p>
@@ -1938,49 +1938,40 @@
           <a:lstStyle/>
           <a:p>
             <a:r>
-              <a:rPr lang="de-DE" dirty="0"/>
-              <a:t>Die wichtigsten Keywords</a:t>
-            </a:r>
-          </a:p>
-          <a:p>
-            <a:r>
-              <a:rPr lang="de-DE" dirty="0"/>
-              <a:t>Mit</a:t>
-            </a:r>
-            <a:r>
-              <a:rPr lang="de-DE" baseline="0" dirty="0"/>
+              <a:rPr lang="en-US" dirty="0" err="1"/>
+              <a:t>Dritte</a:t>
+            </a:r>
+            <a:r>
+              <a:rPr lang="en-US" dirty="0"/>
               <a:t> </a:t>
             </a:r>
             <a:r>
-              <a:rPr lang="de-DE" baseline="0" dirty="0" err="1"/>
-              <a:t>let</a:t>
-            </a:r>
-            <a:r>
-              <a:rPr lang="de-DE" baseline="0" dirty="0"/>
-              <a:t> wird ein Ausdruck gesetzt</a:t>
-            </a:r>
-          </a:p>
-          <a:p>
-            <a:r>
-              <a:rPr lang="de-DE" baseline="0" dirty="0"/>
-              <a:t>Mit type wird ein Typ deklariert</a:t>
-            </a:r>
-          </a:p>
-          <a:p>
-            <a:endParaRPr lang="en-US" dirty="0"/>
-          </a:p>
-          <a:p>
-            <a:r>
               <a:rPr lang="en-US" dirty="0" err="1"/>
-              <a:t>Einrückung</a:t>
-            </a:r>
-            <a:r>
-              <a:rPr lang="en-US" baseline="0" dirty="0"/>
-              <a:t> so </a:t>
-            </a:r>
-            <a:r>
-              <a:rPr lang="en-US" baseline="0" dirty="0" err="1"/>
-              <a:t>verwenden</a:t>
+              <a:t>Möglichkeit</a:t>
+            </a:r>
+            <a:r>
+              <a:rPr lang="en-US" dirty="0"/>
+              <a:t> warden </a:t>
+            </a:r>
+            <a:r>
+              <a:rPr lang="en-US" dirty="0" err="1"/>
+              <a:t>wir</a:t>
+            </a:r>
+            <a:r>
+              <a:rPr lang="en-US" dirty="0"/>
+              <a:t> </a:t>
+            </a:r>
+            <a:r>
+              <a:rPr lang="en-US" dirty="0" err="1"/>
+              <a:t>noch</a:t>
+            </a:r>
+            <a:r>
+              <a:rPr lang="en-US" dirty="0"/>
+              <a:t> </a:t>
+            </a:r>
+            <a:r>
+              <a:rPr lang="en-US" dirty="0" err="1"/>
+              <a:t>gesondert</a:t>
             </a:r>
             <a:r>
               <a:rPr lang="en-US" baseline="0" dirty="0"/>
@@ -1988,11 +1979,7 @@
             </a:r>
             <a:r>
               <a:rPr lang="en-US" baseline="0" dirty="0" err="1"/>
-              <a:t>wie</a:t>
-            </a:r>
-            <a:r>
-              <a:rPr lang="en-US" baseline="0" dirty="0"/>
-              <a:t> Python</a:t>
+              <a:t>behandeln</a:t>
             </a:r>
             <a:endParaRPr lang="en-US" dirty="0"/>
           </a:p>
@@ -2080,62 +2067,60 @@
           <a:p>
             <a:r>
               <a:rPr lang="de-DE" dirty="0"/>
-              <a:t>Die wichtigsten Keywords</a:t>
-            </a:r>
-          </a:p>
-          <a:p>
-            <a:r>
-              <a:rPr lang="de-DE" dirty="0"/>
-              <a:t>Mit</a:t>
+              <a:t>Viele Sprachen haben diese Möglichkeit</a:t>
+            </a:r>
+          </a:p>
+          <a:p>
+            <a:endParaRPr lang="de-DE" dirty="0"/>
+          </a:p>
+          <a:p>
+            <a:r>
+              <a:rPr lang="de-DE" dirty="0"/>
+              <a:t>Es sind drei Funktionen!</a:t>
+            </a:r>
+          </a:p>
+          <a:p>
+            <a:endParaRPr lang="de-DE" dirty="0"/>
+          </a:p>
+          <a:p>
+            <a:r>
+              <a:rPr lang="de-DE" dirty="0"/>
+              <a:t>READ: Liest die Eingabe und parst diese in einer</a:t>
             </a:r>
             <a:r>
               <a:rPr lang="de-DE" baseline="0" dirty="0"/>
-              <a:t> </a:t>
-            </a:r>
-            <a:r>
-              <a:rPr lang="de-DE" baseline="0" dirty="0" err="1"/>
-              <a:t>let</a:t>
-            </a:r>
+              <a:t> Datenstruktur im Speicher.  </a:t>
+            </a:r>
+          </a:p>
+          <a:p>
             <a:r>
               <a:rPr lang="de-DE" baseline="0" dirty="0"/>
-              <a:t> wird ein Ausdruck gesetzt</a:t>
-            </a:r>
-          </a:p>
-          <a:p>
+              <a:t>EVAL: Der Ausdruck aus READ wird jetzt als Aufruf materialisiert. </a:t>
+            </a:r>
             <a:r>
               <a:rPr lang="de-DE" baseline="0" dirty="0"/>
-              <a:t>Mit type wird ein Typ deklariert</a:t>
-            </a:r>
-          </a:p>
-          <a:p>
-            <a:endParaRPr lang="en-US" dirty="0"/>
-          </a:p>
-          <a:p>
-            <a:r>
-              <a:rPr lang="en-US" dirty="0" err="1"/>
-              <a:t>Einrückung</a:t>
-            </a:r>
-            <a:r>
-              <a:rPr lang="en-US" baseline="0" dirty="0"/>
-              <a:t> so </a:t>
-            </a:r>
-            <a:r>
-              <a:rPr lang="en-US" baseline="0" dirty="0" err="1"/>
-              <a:t>verwenden</a:t>
-            </a:r>
-            <a:r>
-              <a:rPr lang="en-US" baseline="0" dirty="0"/>
-              <a:t> </a:t>
-            </a:r>
-            <a:r>
-              <a:rPr lang="en-US" baseline="0" dirty="0" err="1"/>
-              <a:t>wie</a:t>
-            </a:r>
-            <a:r>
-              <a:rPr lang="en-US" baseline="0" dirty="0"/>
-              <a:t> Python</a:t>
-            </a:r>
-            <a:endParaRPr lang="en-US" dirty="0"/>
+              <a:t>Wenn ich einen benannten Ausdruck definiere steht dieser unter dem Namen zur Verfügung.</a:t>
+            </a:r>
+          </a:p>
+          <a:p>
+            <a:r>
+              <a:rPr lang="de-DE" baseline="0" dirty="0"/>
+              <a:t>PRINT: Ausgabe des eben evaluierten Wertes.</a:t>
+            </a:r>
+          </a:p>
+          <a:p>
+            <a:endParaRPr lang="de-DE" baseline="0" dirty="0"/>
+          </a:p>
+          <a:p>
+            <a:r>
+              <a:rPr lang="de-DE" baseline="0" dirty="0"/>
+              <a:t>Im Interaktiven Fenster kann man gut Funktionen aufrufen </a:t>
+            </a:r>
+            <a:r>
+              <a:rPr lang="de-DE" baseline="0"/>
+              <a:t>und testen.</a:t>
+            </a:r>
+            <a:endParaRPr lang="de-DE" baseline="0" dirty="0"/>
           </a:p>
         </p:txBody>
       </p:sp>
@@ -2419,6 +2404,16 @@
           <a:p>
             <a:endParaRPr lang="de-DE" dirty="0"/>
           </a:p>
+          <a:p>
+            <a:r>
+              <a:rPr lang="de-DE" dirty="0" err="1"/>
+              <a:t>Complier</a:t>
+            </a:r>
+            <a:r>
+              <a:rPr lang="de-DE" dirty="0"/>
+              <a:t> Ermittlung erfolgt so weit dies möglich ist</a:t>
+            </a:r>
+          </a:p>
         </p:txBody>
       </p:sp>
       <p:sp>
@@ -2501,29 +2496,6 @@
           <a:bodyPr/>
           <a:lstStyle/>
           <a:p>
-            <a:pPr marL="0" marR="0" lvl="0" indent="0" algn="l" defTabSz="914400" rtl="0" eaLnBrk="1" fontAlgn="auto" latinLnBrk="0" hangingPunct="1">
-              <a:lnSpc>
-                <a:spcPct val="100000"/>
-              </a:lnSpc>
-              <a:spcBef>
-                <a:spcPts val="0"/>
-              </a:spcBef>
-              <a:spcAft>
-                <a:spcPts val="0"/>
-              </a:spcAft>
-              <a:buClrTx/>
-              <a:buSzTx/>
-              <a:buFontTx/>
-              <a:buNone/>
-              <a:tabLst/>
-              <a:defRPr/>
-            </a:pPr>
-            <a:r>
-              <a:rPr lang="de-DE" dirty="0"/>
-              <a:t>Modul 1, Übung Interactive</a:t>
-            </a:r>
-          </a:p>
-          <a:p>
             <a:endParaRPr lang="de-DE" dirty="0"/>
           </a:p>
         </p:txBody>
@@ -2554,7 +2526,7 @@
     </p:spTree>
     <p:extLst>
       <p:ext uri="{BB962C8B-B14F-4D97-AF65-F5344CB8AC3E}">
-        <p14:creationId xmlns:p14="http://schemas.microsoft.com/office/powerpoint/2010/main" val="3993141596"/>
+        <p14:creationId xmlns:p14="http://schemas.microsoft.com/office/powerpoint/2010/main" val="3368434510"/>
       </p:ext>
     </p:extLst>
   </p:cSld>
@@ -6831,7 +6803,7 @@
           <a:p>
             <a:fld id="{28CA3B8B-C56F-4663-93D1-BECEDA7EAF67}" type="datetimeFigureOut">
               <a:rPr lang="en-US" smtClean="0"/>
-              <a:t>3/10/2017</a:t>
+              <a:t>3/11/2017</a:t>
             </a:fld>
             <a:endParaRPr lang="en-US"/>
           </a:p>
@@ -6999,7 +6971,7 @@
           <a:p>
             <a:fld id="{28CA3B8B-C56F-4663-93D1-BECEDA7EAF67}" type="datetimeFigureOut">
               <a:rPr lang="en-US" smtClean="0"/>
-              <a:t>3/10/2017</a:t>
+              <a:t>3/11/2017</a:t>
             </a:fld>
             <a:endParaRPr lang="en-US"/>
           </a:p>
@@ -7177,7 +7149,7 @@
           <a:p>
             <a:fld id="{28CA3B8B-C56F-4663-93D1-BECEDA7EAF67}" type="datetimeFigureOut">
               <a:rPr lang="en-US" smtClean="0"/>
-              <a:t>3/10/2017</a:t>
+              <a:t>3/11/2017</a:t>
             </a:fld>
             <a:endParaRPr lang="en-US"/>
           </a:p>
@@ -7345,7 +7317,7 @@
           <a:p>
             <a:fld id="{28CA3B8B-C56F-4663-93D1-BECEDA7EAF67}" type="datetimeFigureOut">
               <a:rPr lang="en-US" smtClean="0"/>
-              <a:t>3/10/2017</a:t>
+              <a:t>3/11/2017</a:t>
             </a:fld>
             <a:endParaRPr lang="en-US"/>
           </a:p>
@@ -7590,7 +7562,7 @@
           <a:p>
             <a:fld id="{28CA3B8B-C56F-4663-93D1-BECEDA7EAF67}" type="datetimeFigureOut">
               <a:rPr lang="en-US" smtClean="0"/>
-              <a:t>3/10/2017</a:t>
+              <a:t>3/11/2017</a:t>
             </a:fld>
             <a:endParaRPr lang="en-US"/>
           </a:p>
@@ -7875,7 +7847,7 @@
           <a:p>
             <a:fld id="{28CA3B8B-C56F-4663-93D1-BECEDA7EAF67}" type="datetimeFigureOut">
               <a:rPr lang="en-US" smtClean="0"/>
-              <a:t>3/10/2017</a:t>
+              <a:t>3/11/2017</a:t>
             </a:fld>
             <a:endParaRPr lang="en-US"/>
           </a:p>
@@ -8294,7 +8266,7 @@
           <a:p>
             <a:fld id="{28CA3B8B-C56F-4663-93D1-BECEDA7EAF67}" type="datetimeFigureOut">
               <a:rPr lang="en-US" smtClean="0"/>
-              <a:t>3/10/2017</a:t>
+              <a:t>3/11/2017</a:t>
             </a:fld>
             <a:endParaRPr lang="en-US"/>
           </a:p>
@@ -8411,7 +8383,7 @@
           <a:p>
             <a:fld id="{28CA3B8B-C56F-4663-93D1-BECEDA7EAF67}" type="datetimeFigureOut">
               <a:rPr lang="en-US" smtClean="0"/>
-              <a:t>3/10/2017</a:t>
+              <a:t>3/11/2017</a:t>
             </a:fld>
             <a:endParaRPr lang="en-US"/>
           </a:p>
@@ -8506,7 +8478,7 @@
           <a:p>
             <a:fld id="{28CA3B8B-C56F-4663-93D1-BECEDA7EAF67}" type="datetimeFigureOut">
               <a:rPr lang="en-US" smtClean="0"/>
-              <a:t>3/10/2017</a:t>
+              <a:t>3/11/2017</a:t>
             </a:fld>
             <a:endParaRPr lang="en-US"/>
           </a:p>
@@ -8781,7 +8753,7 @@
           <a:p>
             <a:fld id="{28CA3B8B-C56F-4663-93D1-BECEDA7EAF67}" type="datetimeFigureOut">
               <a:rPr lang="en-US" smtClean="0"/>
-              <a:t>3/10/2017</a:t>
+              <a:t>3/11/2017</a:t>
             </a:fld>
             <a:endParaRPr lang="en-US"/>
           </a:p>
@@ -9033,7 +9005,7 @@
           <a:p>
             <a:fld id="{28CA3B8B-C56F-4663-93D1-BECEDA7EAF67}" type="datetimeFigureOut">
               <a:rPr lang="en-US" smtClean="0"/>
-              <a:t>3/10/2017</a:t>
+              <a:t>3/11/2017</a:t>
             </a:fld>
             <a:endParaRPr lang="en-US"/>
           </a:p>
@@ -9244,7 +9216,7 @@
           <a:p>
             <a:fld id="{28CA3B8B-C56F-4663-93D1-BECEDA7EAF67}" type="datetimeFigureOut">
               <a:rPr lang="en-US" smtClean="0"/>
-              <a:t>3/10/2017</a:t>
+              <a:t>3/11/2017</a:t>
             </a:fld>
             <a:endParaRPr lang="en-US"/>
           </a:p>
@@ -13737,6 +13709,19 @@
               <a:rPr lang="de-DE" dirty="0"/>
               <a:t>Script ausführen lassen</a:t>
             </a:r>
+          </a:p>
+          <a:p>
+            <a:r>
+              <a:rPr lang="de-DE" dirty="0"/>
+              <a:t>Dritte Möglichkeit</a:t>
+            </a:r>
+          </a:p>
+          <a:p>
+            <a:pPr lvl="1"/>
+            <a:r>
+              <a:rPr lang="de-DE" dirty="0"/>
+              <a:t>Interaktiv</a:t>
+            </a:r>
             <a:endParaRPr lang="en-US" dirty="0"/>
           </a:p>
         </p:txBody>
@@ -13990,6 +13975,86 @@
                       </p:childTnLst>
                     </p:cTn>
                   </p:par>
+                  <p:par>
+                    <p:cTn id="20" fill="hold">
+                      <p:stCondLst>
+                        <p:cond delay="indefinite"/>
+                      </p:stCondLst>
+                      <p:childTnLst>
+                        <p:par>
+                          <p:cTn id="21" fill="hold">
+                            <p:stCondLst>
+                              <p:cond delay="0"/>
+                            </p:stCondLst>
+                            <p:childTnLst>
+                              <p:par>
+                                <p:cTn id="22" presetID="1" presetClass="entr" presetSubtype="0" fill="hold" grpId="0" nodeType="clickEffect">
+                                  <p:stCondLst>
+                                    <p:cond delay="0"/>
+                                  </p:stCondLst>
+                                  <p:childTnLst>
+                                    <p:set>
+                                      <p:cBhvr>
+                                        <p:cTn id="23" dur="1" fill="hold">
+                                          <p:stCondLst>
+                                            <p:cond delay="0"/>
+                                          </p:stCondLst>
+                                        </p:cTn>
+                                        <p:tgtEl>
+                                          <p:spTgt spid="3">
+                                            <p:txEl>
+                                              <p:pRg st="6" end="6"/>
+                                            </p:txEl>
+                                          </p:spTgt>
+                                        </p:tgtEl>
+                                        <p:attrNameLst>
+                                          <p:attrName>style.visibility</p:attrName>
+                                        </p:attrNameLst>
+                                      </p:cBhvr>
+                                      <p:to>
+                                        <p:strVal val="visible"/>
+                                      </p:to>
+                                    </p:set>
+                                  </p:childTnLst>
+                                </p:cTn>
+                              </p:par>
+                              <p:par>
+                                <p:cTn id="24" presetID="1" presetClass="entr" presetSubtype="0" fill="hold" grpId="0" nodeType="withEffect">
+                                  <p:stCondLst>
+                                    <p:cond delay="0"/>
+                                  </p:stCondLst>
+                                  <p:childTnLst>
+                                    <p:set>
+                                      <p:cBhvr>
+                                        <p:cTn id="25" dur="1" fill="hold">
+                                          <p:stCondLst>
+                                            <p:cond delay="0"/>
+                                          </p:stCondLst>
+                                        </p:cTn>
+                                        <p:tgtEl>
+                                          <p:spTgt spid="3">
+                                            <p:txEl>
+                                              <p:pRg st="7" end="7"/>
+                                            </p:txEl>
+                                          </p:spTgt>
+                                        </p:tgtEl>
+                                        <p:attrNameLst>
+                                          <p:attrName>style.visibility</p:attrName>
+                                        </p:attrNameLst>
+                                      </p:cBhvr>
+                                      <p:to>
+                                        <p:strVal val="visible"/>
+                                      </p:to>
+                                    </p:set>
+                                  </p:childTnLst>
+                                </p:cTn>
+                              </p:par>
+                            </p:childTnLst>
+                          </p:cTn>
+                        </p:par>
+                      </p:childTnLst>
+                    </p:cTn>
+                  </p:par>
                 </p:childTnLst>
               </p:cTn>
               <p:prevCondLst>
@@ -14099,11 +14164,13 @@
             </a:r>
           </a:p>
           <a:p>
-            <a:r>
-              <a:rPr lang="de-DE"/>
+            <a:pPr marL="0" indent="0">
+              <a:buNone/>
+            </a:pPr>
+            <a:r>
+              <a:rPr lang="de-DE" dirty="0"/>
               <a:t>Loop</a:t>
             </a:r>
-            <a:endParaRPr lang="de-DE" dirty="0"/>
           </a:p>
         </p:txBody>
       </p:sp>
@@ -14806,29 +14873,16 @@
           <a:p>
             <a:r>
               <a:rPr lang="de-DE" dirty="0"/>
-              <a:t>Ist das F# Interactive Fenster offen?</a:t>
-            </a:r>
-          </a:p>
-          <a:p>
-            <a:r>
-              <a:rPr lang="de-DE" dirty="0"/>
-              <a:t>Markiere eine Zeile Code </a:t>
-            </a:r>
-          </a:p>
-          <a:p>
-            <a:r>
-              <a:rPr lang="de-DE" dirty="0"/>
-              <a:t>Alt + Enter</a:t>
-            </a:r>
-          </a:p>
-          <a:p>
-            <a:r>
-              <a:rPr lang="de-DE" dirty="0" err="1"/>
-              <a:t>Reset</a:t>
-            </a:r>
-            <a:r>
-              <a:rPr lang="de-DE" dirty="0"/>
-              <a:t> setzt zurück</a:t>
+              <a:t>Alt + Enter Schickt den Ausdruck zum REPL</a:t>
+            </a:r>
+          </a:p>
+          <a:p>
+            <a:endParaRPr lang="de-DE" dirty="0"/>
+          </a:p>
+          <a:p>
+            <a:r>
+              <a:rPr lang="de-DE" dirty="0"/>
+              <a:t>Reset setzt zurück</a:t>
             </a:r>
           </a:p>
           <a:p>
@@ -14839,7 +14893,7 @@
     </p:spTree>
     <p:extLst>
       <p:ext uri="{BB962C8B-B14F-4D97-AF65-F5344CB8AC3E}">
-        <p14:creationId xmlns:p14="http://schemas.microsoft.com/office/powerpoint/2010/main" val="2413476098"/>
+        <p14:creationId xmlns:p14="http://schemas.microsoft.com/office/powerpoint/2010/main" val="1146460567"/>
       </p:ext>
     </p:extLst>
   </p:cSld>
@@ -14931,105 +14985,7 @@
                                         <p:tgtEl>
                                           <p:spTgt spid="3">
                                             <p:txEl>
-                                              <p:pRg st="1" end="1"/>
-                                            </p:txEl>
-                                          </p:spTgt>
-                                        </p:tgtEl>
-                                        <p:attrNameLst>
-                                          <p:attrName>style.visibility</p:attrName>
-                                        </p:attrNameLst>
-                                      </p:cBhvr>
-                                      <p:to>
-                                        <p:strVal val="visible"/>
-                                      </p:to>
-                                    </p:set>
-                                  </p:childTnLst>
-                                </p:cTn>
-                              </p:par>
-                            </p:childTnLst>
-                          </p:cTn>
-                        </p:par>
-                      </p:childTnLst>
-                    </p:cTn>
-                  </p:par>
-                  <p:par>
-                    <p:cTn id="11" fill="hold">
-                      <p:stCondLst>
-                        <p:cond delay="indefinite"/>
-                      </p:stCondLst>
-                      <p:childTnLst>
-                        <p:par>
-                          <p:cTn id="12" fill="hold">
-                            <p:stCondLst>
-                              <p:cond delay="0"/>
-                            </p:stCondLst>
-                            <p:childTnLst>
-                              <p:par>
-                                <p:cTn id="13" presetID="1" presetClass="entr" presetSubtype="0" fill="hold" grpId="0" nodeType="clickEffect">
-                                  <p:stCondLst>
-                                    <p:cond delay="0"/>
-                                  </p:stCondLst>
-                                  <p:childTnLst>
-                                    <p:set>
-                                      <p:cBhvr>
-                                        <p:cTn id="14" dur="1" fill="hold">
-                                          <p:stCondLst>
-                                            <p:cond delay="0"/>
-                                          </p:stCondLst>
-                                        </p:cTn>
-                                        <p:tgtEl>
-                                          <p:spTgt spid="3">
-                                            <p:txEl>
                                               <p:pRg st="2" end="2"/>
-                                            </p:txEl>
-                                          </p:spTgt>
-                                        </p:tgtEl>
-                                        <p:attrNameLst>
-                                          <p:attrName>style.visibility</p:attrName>
-                                        </p:attrNameLst>
-                                      </p:cBhvr>
-                                      <p:to>
-                                        <p:strVal val="visible"/>
-                                      </p:to>
-                                    </p:set>
-                                  </p:childTnLst>
-                                </p:cTn>
-                              </p:par>
-                            </p:childTnLst>
-                          </p:cTn>
-                        </p:par>
-                      </p:childTnLst>
-                    </p:cTn>
-                  </p:par>
-                  <p:par>
-                    <p:cTn id="15" fill="hold">
-                      <p:stCondLst>
-                        <p:cond delay="indefinite"/>
-                      </p:stCondLst>
-                      <p:childTnLst>
-                        <p:par>
-                          <p:cTn id="16" fill="hold">
-                            <p:stCondLst>
-                              <p:cond delay="0"/>
-                            </p:stCondLst>
-                            <p:childTnLst>
-                              <p:par>
-                                <p:cTn id="17" presetID="1" presetClass="entr" presetSubtype="0" fill="hold" grpId="0" nodeType="clickEffect">
-                                  <p:stCondLst>
-                                    <p:cond delay="0"/>
-                                  </p:stCondLst>
-                                  <p:childTnLst>
-                                    <p:set>
-                                      <p:cBhvr>
-                                        <p:cTn id="18" dur="1" fill="hold">
-                                          <p:stCondLst>
-                                            <p:cond delay="0"/>
-                                          </p:stCondLst>
-                                        </p:cTn>
-                                        <p:tgtEl>
-                                          <p:spTgt spid="3">
-                                            <p:txEl>
-                                              <p:pRg st="3" end="3"/>
                                             </p:txEl>
                                           </p:spTgt>
                                         </p:tgtEl>

</xml_diff>